<commit_message>
changes to ppt and excel
</commit_message>
<xml_diff>
--- a/Week4 Pre/CT Project Weekly Status Report 6-26-2020.pptx
+++ b/Week4 Pre/CT Project Weekly Status Report 6-26-2020.pptx
@@ -8184,6 +8184,16 @@
                 </a:solidFill>
               </a:rPr>
               <a:t>Analyze Germany Corona-Warn-App UIUX</a:t>
+            </a:r>
+          </a:p>
+          <a:p>
+            <a:r>
+              <a:rPr lang="en-US" dirty="0">
+                <a:solidFill>
+                  <a:schemeClr val="tx2"/>
+                </a:solidFill>
+              </a:rPr>
+              <a:t>Design dashboard to analyze data </a:t>
             </a:r>
           </a:p>
         </p:txBody>

</xml_diff>